<commit_message>
Fix wrong use of arrow
</commit_message>
<xml_diff>
--- a/docs/diagrams/Diagrams.pptx
+++ b/docs/diagrams/Diagrams.pptx
@@ -216,7 +216,7 @@
           <a:p>
             <a:fld id="{F5CC4B3F-88C1-4FFA-B1B6-F41C21DC6924}" type="datetimeFigureOut">
               <a:rPr lang="en-US" smtClean="0"/>
-              <a:t>10/25/2016</a:t>
+              <a:t>10/26/2016</a:t>
             </a:fld>
             <a:endParaRPr lang="en-US" dirty="0"/>
           </a:p>
@@ -662,7 +662,7 @@
           <a:p>
             <a:fld id="{78C97017-6FC3-485B-9764-EAC9E56C1D49}" type="datetimeFigureOut">
               <a:rPr lang="en-US" smtClean="0"/>
-              <a:t>10/25/2016</a:t>
+              <a:t>10/26/2016</a:t>
             </a:fld>
             <a:endParaRPr lang="en-US" dirty="0"/>
           </a:p>
@@ -830,7 +830,7 @@
           <a:p>
             <a:fld id="{78C97017-6FC3-485B-9764-EAC9E56C1D49}" type="datetimeFigureOut">
               <a:rPr lang="en-US" smtClean="0"/>
-              <a:t>10/25/2016</a:t>
+              <a:t>10/26/2016</a:t>
             </a:fld>
             <a:endParaRPr lang="en-US" dirty="0"/>
           </a:p>
@@ -1008,7 +1008,7 @@
           <a:p>
             <a:fld id="{78C97017-6FC3-485B-9764-EAC9E56C1D49}" type="datetimeFigureOut">
               <a:rPr lang="en-US" smtClean="0"/>
-              <a:t>10/25/2016</a:t>
+              <a:t>10/26/2016</a:t>
             </a:fld>
             <a:endParaRPr lang="en-US" dirty="0"/>
           </a:p>
@@ -1176,7 +1176,7 @@
           <a:p>
             <a:fld id="{78C97017-6FC3-485B-9764-EAC9E56C1D49}" type="datetimeFigureOut">
               <a:rPr lang="en-US" smtClean="0"/>
-              <a:t>10/25/2016</a:t>
+              <a:t>10/26/2016</a:t>
             </a:fld>
             <a:endParaRPr lang="en-US" dirty="0"/>
           </a:p>
@@ -1421,7 +1421,7 @@
           <a:p>
             <a:fld id="{78C97017-6FC3-485B-9764-EAC9E56C1D49}" type="datetimeFigureOut">
               <a:rPr lang="en-US" smtClean="0"/>
-              <a:t>10/25/2016</a:t>
+              <a:t>10/26/2016</a:t>
             </a:fld>
             <a:endParaRPr lang="en-US" dirty="0"/>
           </a:p>
@@ -1706,7 +1706,7 @@
           <a:p>
             <a:fld id="{78C97017-6FC3-485B-9764-EAC9E56C1D49}" type="datetimeFigureOut">
               <a:rPr lang="en-US" smtClean="0"/>
-              <a:t>10/25/2016</a:t>
+              <a:t>10/26/2016</a:t>
             </a:fld>
             <a:endParaRPr lang="en-US" dirty="0"/>
           </a:p>
@@ -2125,7 +2125,7 @@
           <a:p>
             <a:fld id="{78C97017-6FC3-485B-9764-EAC9E56C1D49}" type="datetimeFigureOut">
               <a:rPr lang="en-US" smtClean="0"/>
-              <a:t>10/25/2016</a:t>
+              <a:t>10/26/2016</a:t>
             </a:fld>
             <a:endParaRPr lang="en-US" dirty="0"/>
           </a:p>
@@ -2242,7 +2242,7 @@
           <a:p>
             <a:fld id="{78C97017-6FC3-485B-9764-EAC9E56C1D49}" type="datetimeFigureOut">
               <a:rPr lang="en-US" smtClean="0"/>
-              <a:t>10/25/2016</a:t>
+              <a:t>10/26/2016</a:t>
             </a:fld>
             <a:endParaRPr lang="en-US" dirty="0"/>
           </a:p>
@@ -2337,7 +2337,7 @@
           <a:p>
             <a:fld id="{78C97017-6FC3-485B-9764-EAC9E56C1D49}" type="datetimeFigureOut">
               <a:rPr lang="en-US" smtClean="0"/>
-              <a:t>10/25/2016</a:t>
+              <a:t>10/26/2016</a:t>
             </a:fld>
             <a:endParaRPr lang="en-US" dirty="0"/>
           </a:p>
@@ -2612,7 +2612,7 @@
           <a:p>
             <a:fld id="{78C97017-6FC3-485B-9764-EAC9E56C1D49}" type="datetimeFigureOut">
               <a:rPr lang="en-US" smtClean="0"/>
-              <a:t>10/25/2016</a:t>
+              <a:t>10/26/2016</a:t>
             </a:fld>
             <a:endParaRPr lang="en-US" dirty="0"/>
           </a:p>
@@ -2864,7 +2864,7 @@
           <a:p>
             <a:fld id="{78C97017-6FC3-485B-9764-EAC9E56C1D49}" type="datetimeFigureOut">
               <a:rPr lang="en-US" smtClean="0"/>
-              <a:t>10/25/2016</a:t>
+              <a:t>10/26/2016</a:t>
             </a:fld>
             <a:endParaRPr lang="en-US" dirty="0"/>
           </a:p>
@@ -3075,7 +3075,7 @@
           <a:p>
             <a:fld id="{78C97017-6FC3-485B-9764-EAC9E56C1D49}" type="datetimeFigureOut">
               <a:rPr lang="en-US" smtClean="0"/>
-              <a:t>10/25/2016</a:t>
+              <a:t>10/26/2016</a:t>
             </a:fld>
             <a:endParaRPr lang="en-US" dirty="0"/>
           </a:p>
@@ -10308,13 +10308,11 @@
       <p:cxnSp>
         <p:nvCxnSpPr>
           <p:cNvPr id="19" name="Elbow Connector 106"/>
-          <p:cNvCxnSpPr>
-            <a:endCxn id="18" idx="1"/>
-          </p:cNvCxnSpPr>
+          <p:cNvCxnSpPr/>
           <p:nvPr/>
         </p:nvCxnSpPr>
         <p:spPr>
-          <a:xfrm flipV="1">
+          <a:xfrm flipH="1" flipV="1">
             <a:off x="5252622" y="3939539"/>
             <a:ext cx="531847" cy="2146"/>
           </a:xfrm>
@@ -10329,7 +10327,7 @@
             </a:solidFill>
             <a:prstDash val="solid"/>
             <a:headEnd type="none" w="med" len="med"/>
-            <a:tailEnd type="arrow" w="med" len="med"/>
+            <a:tailEnd type="triangle" w="lg" len="lg"/>
           </a:ln>
           <a:effectLst/>
         </p:spPr>

</xml_diff>